<commit_message>
Updated plotters for transfer talk
</commit_message>
<xml_diff>
--- a/FirstNineDayEpPlots.pptx
+++ b/FirstNineDayEpPlots.pptx
@@ -2160,7 +2160,21 @@
                 <a:latin typeface="Arial" panose="020B0604020202020204" pitchFamily="34" charset="0"/>
                 <a:cs typeface="Arial" panose="020B0604020202020204" pitchFamily="34" charset="0"/>
               </a:rPr>
-              <a:t>First E/p plots for the 9 day</a:t>
+              <a:t>First E/</a:t>
+            </a:r>
+            <a:r>
+              <a:rPr lang="en-US" sz="3200" b="1" i="1">
+                <a:latin typeface="Arial" panose="020B0604020202020204" pitchFamily="34" charset="0"/>
+                <a:cs typeface="Arial" panose="020B0604020202020204" pitchFamily="34" charset="0"/>
+              </a:rPr>
+              <a:t>p fits with </a:t>
+            </a:r>
+            <a:r>
+              <a:rPr lang="en-US" sz="3200" b="1" i="1" dirty="0">
+                <a:latin typeface="Arial" panose="020B0604020202020204" pitchFamily="34" charset="0"/>
+                <a:cs typeface="Arial" panose="020B0604020202020204" pitchFamily="34" charset="0"/>
+              </a:rPr>
+              <a:t>the 9 day</a:t>
             </a:r>
           </a:p>
         </p:txBody>
@@ -2472,8 +2486,8 @@
           </a:p>
         </p:txBody>
       </p:sp>
-      <mc:AlternateContent xmlns:mc="http://schemas.openxmlformats.org/markup-compatibility/2006">
-        <mc:Choice xmlns:a14="http://schemas.microsoft.com/office/drawing/2010/main" Requires="a14">
+      <mc:AlternateContent xmlns:mc="http://schemas.openxmlformats.org/markup-compatibility/2006" xmlns:a14="http://schemas.microsoft.com/office/drawing/2010/main">
+        <mc:Choice Requires="a14">
           <p:sp>
             <p:nvSpPr>
               <p:cNvPr id="14" name="TextBox 13">
@@ -2504,7 +2518,7 @@
               <a:p>
                 <a:r>
                   <a:rPr lang="en-US" dirty="0"/>
-                  <a:t>We can remove the gain correction on 9 day DSTs* without modifying the trees, and make E/p plots...</a:t>
+                  <a:t>We can remove the gain correction on the 9 day DSTs* without modifying them, and make some E/p plots... </a:t>
                 </a:r>
                 <a:endParaRPr lang="en-US" b="1" i="1" dirty="0"/>
               </a:p>
@@ -2513,8 +2527,12 @@
               </a:p>
               <a:p>
                 <a:r>
+                  <a:rPr lang="en-US"/>
+                  <a:t>How? </a:t>
+                </a:r>
+                <a:r>
                   <a:rPr lang="en-US" dirty="0"/>
-                  <a:t> Re-define cluster energy inside plotter code so that</a:t>
+                  <a:t>Re-define cluster energy inside plotter code so that</a:t>
                 </a:r>
               </a:p>
               <a:p>
@@ -2524,6 +2542,7 @@
                 <a:endParaRPr lang="en-US" dirty="0"/>
               </a:p>
               <a:p>
+                <a:pPr/>
                 <a14:m>
                   <m:oMathPara xmlns:m="http://schemas.openxmlformats.org/officeDocument/2006/math">
                     <m:oMathParaPr>
@@ -2708,7 +2727,7 @@
             </p:txBody>
           </p:sp>
         </mc:Choice>
-        <mc:Fallback>
+        <mc:Fallback xmlns="">
           <p:sp>
             <p:nvSpPr>
               <p:cNvPr id="14" name="TextBox 13">
@@ -2925,8 +2944,8 @@
         </p:nvSpPr>
         <p:spPr>
           <a:xfrm>
-            <a:off x="6386403" y="1804286"/>
-            <a:ext cx="2577600" cy="1754326"/>
+            <a:off x="6337351" y="1451237"/>
+            <a:ext cx="2577600" cy="2862322"/>
           </a:xfrm>
           <a:prstGeom prst="rect">
             <a:avLst/>
@@ -2945,7 +2964,32 @@
             </a:pPr>
             <a:r>
               <a:rPr lang="en-US" dirty="0"/>
-              <a:t>Fits are good!</a:t>
+              <a:t>Fits are good;</a:t>
+            </a:r>
+          </a:p>
+          <a:p>
+            <a:pPr marL="285750" indent="-285750">
+              <a:buFont typeface="Arial" panose="020B0604020202020204" pitchFamily="34" charset="0"/>
+              <a:buChar char="•"/>
+            </a:pPr>
+            <a:endParaRPr lang="en-US" dirty="0"/>
+          </a:p>
+          <a:p>
+            <a:pPr marL="285750" indent="-285750">
+              <a:buFont typeface="Arial" panose="020B0604020202020204" pitchFamily="34" charset="0"/>
+              <a:buChar char="•"/>
+            </a:pPr>
+            <a:r>
+              <a:rPr lang="en-US" dirty="0"/>
+              <a:t>Short lifetime board has a longer </a:t>
+            </a:r>
+            <a:r>
+              <a:rPr lang="en-US"/>
+              <a:t>lifetime than </a:t>
+            </a:r>
+            <a:r>
+              <a:rPr lang="en-US" dirty="0"/>
+              <a:t>it should;</a:t>
             </a:r>
           </a:p>
           <a:p>
@@ -3155,8 +3199,8 @@
         </p:nvSpPr>
         <p:spPr>
           <a:xfrm>
-            <a:off x="6526058" y="1590771"/>
-            <a:ext cx="2510899" cy="2862322"/>
+            <a:off x="6457072" y="1175273"/>
+            <a:ext cx="2510899" cy="3416320"/>
           </a:xfrm>
           <a:prstGeom prst="rect">
             <a:avLst/>
@@ -3200,7 +3244,7 @@
             </a:pPr>
             <a:r>
               <a:rPr lang="en-US" dirty="0"/>
-              <a:t>Some odd ones, so I increased the stat cut by factor of 3.6 (next slide).</a:t>
+              <a:t>Some odd ones, so I increased the stat cut by factor of 3.6 to reflect the increase in stats for the 9 day (next slide).</a:t>
             </a:r>
           </a:p>
           <a:p>

</xml_diff>